<commit_message>
Change URL of github repo
</commit_message>
<xml_diff>
--- a/Intelligent Network Element intro.pptx
+++ b/Intelligent Network Element intro.pptx
@@ -4158,10 +4158,16 @@
               <a:rPr lang="en-GB" dirty="0">
                 <a:hlinkClick r:id="rId3"/>
               </a:rPr>
-              <a:t>https://github.com/VMatrix1900/Intelligent-Network-Element-Sidemeeting</a:t>
-            </a:r>
-            <a:r>
-              <a:rPr lang="zh-CN" altLang="en-US" sz="1800" dirty="0"/>
+              <a:t>https://github.com/VMatrix1900</a:t>
+            </a:r>
+            <a:r>
+              <a:rPr lang="en-GB">
+                <a:hlinkClick r:id="rId3"/>
+              </a:rPr>
+              <a:t>/Intelligent-Network-Element</a:t>
+            </a:r>
+            <a:r>
+              <a:rPr lang="zh-CN" altLang="en-US" sz="1800"/>
               <a:t> </a:t>
             </a:r>
             <a:endParaRPr lang="en-GB" sz="1800" dirty="0"/>

</xml_diff>